<commit_message>
Add  new product benchmarking
</commit_message>
<xml_diff>
--- a/Product benchmarking/product benchmarking.pptx
+++ b/Product benchmarking/product benchmarking.pptx
@@ -7789,7 +7789,7 @@
         </p:spPr>
         <p:txBody>
           <a:bodyPr anchorCtr="0" anchor="t" bIns="91425" lIns="91425" spcFirstLastPara="1" rIns="91425" wrap="square" tIns="91425">
-            <a:normAutofit/>
+            <a:normAutofit lnSpcReduction="20000"/>
           </a:bodyPr>
           <a:lstStyle/>
           <a:p>
@@ -7812,7 +7812,7 @@
                 <a:cs typeface="Raleway"/>
                 <a:sym typeface="Raleway"/>
               </a:rPr>
-              <a:t>Uplift-скоринг клиентов по отклику на скидку (по сути — «обёртка» над идеями scikit-uplift, но под конкретный бизнес-кейс).</a:t>
+              <a:t>Uplift-скоринг клиентов по отклику на скидку на основе исторических данных (скоринговая модель, оценивающая, насколько скидка меняет вероятность покупки).</a:t>
             </a:r>
             <a:endParaRPr sz="1600"/>
           </a:p>
@@ -8299,7 +8299,7 @@
                 <a:cs typeface="Raleway"/>
                 <a:sym typeface="Raleway"/>
               </a:rPr>
-              <a:t>Узкая специализация: только эффективность скидок и промо, а не «весь маркетинг» как у Klaviyo/Optimove.</a:t>
+              <a:t>Узкая специализация: только эффективность скидок и промо, а не «весь маркетинг».</a:t>
             </a:r>
             <a:endParaRPr sz="1600"/>
           </a:p>
@@ -8721,7 +8721,7 @@
         </p:nvSpPr>
         <p:spPr>
           <a:xfrm>
-            <a:off x="340934" y="2199000"/>
+            <a:off x="183871" y="2588388"/>
             <a:ext cx="1872300" cy="745500"/>
           </a:xfrm>
           <a:prstGeom prst="homePlate">
@@ -8772,7 +8772,7 @@
         </p:nvGrpSpPr>
         <p:grpSpPr>
           <a:xfrm>
-            <a:off x="969270" y="1610215"/>
+            <a:off x="812207" y="1999603"/>
             <a:ext cx="198900" cy="593656"/>
             <a:chOff x="777447" y="1610215"/>
             <a:chExt cx="198900" cy="593656"/>
@@ -8858,8 +8858,8 @@
         </p:nvSpPr>
         <p:spPr>
           <a:xfrm>
-            <a:off x="340925" y="571250"/>
-            <a:ext cx="4057500" cy="906300"/>
+            <a:off x="196538" y="126100"/>
+            <a:ext cx="4286700" cy="1823400"/>
           </a:xfrm>
           <a:prstGeom prst="rect">
             <a:avLst/>
@@ -8871,31 +8871,83 @@
           </a:bodyPr>
           <a:lstStyle/>
           <a:p>
-            <a:pPr indent="0" lvl="0" marL="0" rtl="0" algn="l">
-              <a:spcBef>
-                <a:spcPts val="0"/>
-              </a:spcBef>
-              <a:spcAft>
-                <a:spcPts val="1200"/>
-              </a:spcAft>
-              <a:buClr>
-                <a:srgbClr val="000000"/>
-              </a:buClr>
-              <a:buSzPts val="935"/>
-              <a:buFont typeface="Arial"/>
+            <a:pPr indent="0" lvl="0" marL="0" rtl="0" algn="just">
+              <a:lnSpc>
+                <a:spcPct val="100000"/>
+              </a:lnSpc>
+              <a:spcBef>
+                <a:spcPts val="0"/>
+              </a:spcBef>
+              <a:spcAft>
+                <a:spcPts val="0"/>
+              </a:spcAft>
+              <a:buNone/>
+            </a:pPr>
+            <a:r>
+              <a:rPr i="1" lang="ru" sz="1400"/>
+              <a:t>TTV (Time-to-Value) – не более 2 недель.</a:t>
+            </a:r>
+            <a:endParaRPr i="1" sz="1400"/>
+          </a:p>
+          <a:p>
+            <a:pPr indent="0" lvl="0" marL="0" rtl="0" algn="just">
+              <a:lnSpc>
+                <a:spcPct val="100000"/>
+              </a:lnSpc>
+              <a:spcBef>
+                <a:spcPts val="0"/>
+              </a:spcBef>
+              <a:spcAft>
+                <a:spcPts val="0"/>
+              </a:spcAft>
               <a:buNone/>
             </a:pPr>
             <a:r>
               <a:rPr lang="ru" sz="1400"/>
-              <a:t>Прирост конверсии таргетированных промо на </a:t>
+              <a:t>На рынке (Klaviyo, Optimove, Mindbox) среднее время до первой кампании с использованием платформы составляет около 5–6 недель. </a:t>
             </a:r>
+            <a:endParaRPr sz="1400"/>
+          </a:p>
+          <a:p>
+            <a:pPr indent="0" lvl="0" marL="0" rtl="0" algn="just">
+              <a:lnSpc>
+                <a:spcPct val="100000"/>
+              </a:lnSpc>
+              <a:spcBef>
+                <a:spcPts val="0"/>
+              </a:spcBef>
+              <a:spcAft>
+                <a:spcPts val="0"/>
+              </a:spcAft>
+              <a:buNone/>
+            </a:pPr>
             <a:r>
-              <a:rPr b="1" lang="ru" sz="1400"/>
-              <a:t>+3–5 п.п.</a:t>
+              <a:rPr lang="ru" sz="1400"/>
+              <a:t>За счет</a:t>
             </a:r>
             <a:r>
               <a:rPr lang="ru" sz="1400"/>
-              <a:t> относительно текущей «наивной» стратегии.</a:t>
+              <a:t> узкой специализации на скидках и простых интеграций я закладываю цель: подключение данных и запуск первой кампании со скорингом не более чем за 2 недели.</a:t>
+            </a:r>
+            <a:endParaRPr sz="1400"/>
+          </a:p>
+          <a:p>
+            <a:pPr indent="0" lvl="0" marL="0" rtl="0" algn="l">
+              <a:spcBef>
+                <a:spcPts val="0"/>
+              </a:spcBef>
+              <a:spcAft>
+                <a:spcPts val="1200"/>
+              </a:spcAft>
+              <a:buClr>
+                <a:srgbClr val="000000"/>
+              </a:buClr>
+              <a:buSzPts val="935"/>
+              <a:buFont typeface="Arial"/>
+              <a:buNone/>
+            </a:pPr>
+            <a:r>
+              <a:t/>
             </a:r>
             <a:endParaRPr sz="1400"/>
           </a:p>
@@ -8909,7 +8961,7 @@
         </p:nvSpPr>
         <p:spPr>
           <a:xfrm>
-            <a:off x="1817054" y="2199000"/>
+            <a:off x="1659991" y="2588388"/>
             <a:ext cx="2051100" cy="745500"/>
           </a:xfrm>
           <a:prstGeom prst="chevron">
@@ -8960,8 +9012,8 @@
         </p:nvGrpSpPr>
         <p:grpSpPr>
           <a:xfrm>
-            <a:off x="4441407" y="2944508"/>
-            <a:ext cx="198900" cy="593656"/>
+            <a:off x="4284350" y="3333963"/>
+            <a:ext cx="198900" cy="470413"/>
             <a:chOff x="2223534" y="2938958"/>
             <a:chExt cx="198900" cy="593656"/>
           </a:xfrm>
@@ -9046,8 +9098,8 @@
         </p:nvSpPr>
         <p:spPr>
           <a:xfrm>
-            <a:off x="2800693" y="3675725"/>
-            <a:ext cx="3480300" cy="906300"/>
+            <a:off x="1763975" y="3752700"/>
+            <a:ext cx="6404700" cy="1390800"/>
           </a:xfrm>
           <a:prstGeom prst="rect">
             <a:avLst/>
@@ -9059,6 +9111,87 @@
           </a:bodyPr>
           <a:lstStyle/>
           <a:p>
+            <a:pPr indent="0" lvl="0" marL="0" rtl="0" algn="just">
+              <a:lnSpc>
+                <a:spcPct val="95000"/>
+              </a:lnSpc>
+              <a:spcBef>
+                <a:spcPts val="0"/>
+              </a:spcBef>
+              <a:spcAft>
+                <a:spcPts val="0"/>
+              </a:spcAft>
+              <a:buNone/>
+            </a:pPr>
+            <a:r>
+              <a:rPr i="1" lang="ru" sz="1400"/>
+              <a:t>Уровень no-code для маркетолога – не ниже 2,5 из 3.</a:t>
+            </a:r>
+            <a:endParaRPr i="1" sz="1400"/>
+          </a:p>
+          <a:p>
+            <a:pPr indent="0" lvl="0" marL="0" rtl="0" algn="just">
+              <a:lnSpc>
+                <a:spcPct val="95000"/>
+              </a:lnSpc>
+              <a:spcBef>
+                <a:spcPts val="0"/>
+              </a:spcBef>
+              <a:spcAft>
+                <a:spcPts val="0"/>
+              </a:spcAft>
+              <a:buNone/>
+            </a:pPr>
+            <a:r>
+              <a:rPr lang="ru" sz="1400"/>
+              <a:t>Конкуренты в среднем дают уровень около 2,3: многое можно сделать руками маркетолога, но для сложных сценариев нужен аналитик/IT. </a:t>
+            </a:r>
+            <a:endParaRPr sz="1400"/>
+          </a:p>
+          <a:p>
+            <a:pPr indent="0" lvl="0" marL="0" rtl="0" algn="just">
+              <a:lnSpc>
+                <a:spcPct val="95000"/>
+              </a:lnSpc>
+              <a:spcBef>
+                <a:spcPts val="0"/>
+              </a:spcBef>
+              <a:spcAft>
+                <a:spcPts val="0"/>
+              </a:spcAft>
+              <a:buNone/>
+            </a:pPr>
+            <a:r>
+              <a:rPr lang="ru" sz="1400"/>
+              <a:t>В </a:t>
+            </a:r>
+            <a:r>
+              <a:rPr lang="ru" sz="1400"/>
+              <a:t>моем</a:t>
+            </a:r>
+            <a:r>
+              <a:rPr lang="ru" sz="1400"/>
+              <a:t> продукте </a:t>
+            </a:r>
+            <a:r>
+              <a:rPr lang="ru" sz="1400"/>
+              <a:t>маркетолог</a:t>
+            </a:r>
+            <a:r>
+              <a:rPr lang="ru" sz="1400"/>
+              <a:t> и CRM-менеджер должны сами запускать </a:t>
+            </a:r>
+            <a:r>
+              <a:rPr lang="ru" sz="1400"/>
+              <a:t>пересчет</a:t>
+            </a:r>
+            <a:r>
+              <a:rPr lang="ru" sz="1400"/>
+              <a:t> модели, выбирать сегменты по uplift-рейтингу и выгружать списки клиентов, а аналитик участвует только в настройке.</a:t>
+            </a:r>
+            <a:endParaRPr sz="1400"/>
+          </a:p>
+          <a:p>
             <a:pPr indent="0" lvl="0" marL="0" rtl="0" algn="l">
               <a:lnSpc>
                 <a:spcPct val="95000"/>
@@ -9077,16 +9210,7 @@
               <a:buNone/>
             </a:pPr>
             <a:r>
-              <a:rPr lang="ru" sz="1400"/>
-              <a:t>Снижение доли «бесполезных» скидок (клиент купил бы без скидки) на </a:t>
-            </a:r>
-            <a:r>
-              <a:rPr b="1" lang="ru" sz="1400"/>
-              <a:t>10–20%</a:t>
-            </a:r>
-            <a:r>
-              <a:rPr lang="ru" sz="1400"/>
-              <a:t> при той же выручке.</a:t>
+              <a:t/>
             </a:r>
             <a:endParaRPr sz="1400"/>
           </a:p>
@@ -9115,7 +9239,7 @@
         </p:nvSpPr>
         <p:spPr>
           <a:xfrm>
-            <a:off x="3471973" y="2199000"/>
+            <a:off x="3314911" y="2588388"/>
             <a:ext cx="2051100" cy="745500"/>
           </a:xfrm>
           <a:prstGeom prst="chevron">
@@ -9166,7 +9290,7 @@
         </p:nvSpPr>
         <p:spPr>
           <a:xfrm>
-            <a:off x="5126893" y="2199000"/>
+            <a:off x="4969831" y="2588388"/>
             <a:ext cx="2051100" cy="745500"/>
           </a:xfrm>
           <a:prstGeom prst="chevron">
@@ -9217,7 +9341,7 @@
         </p:nvSpPr>
         <p:spPr>
           <a:xfrm>
-            <a:off x="6781813" y="2199000"/>
+            <a:off x="6624751" y="2588388"/>
             <a:ext cx="2051100" cy="745500"/>
           </a:xfrm>
           <a:prstGeom prst="chevron">
@@ -9270,7 +9394,7 @@
         </p:nvSpPr>
         <p:spPr>
           <a:xfrm>
-            <a:off x="654800" y="2336550"/>
+            <a:off x="454413" y="2728363"/>
             <a:ext cx="7772100" cy="470400"/>
           </a:xfrm>
           <a:prstGeom prst="rect">
@@ -9328,7 +9452,7 @@
         </p:nvGrpSpPr>
         <p:grpSpPr>
           <a:xfrm>
-            <a:off x="7669807" y="1610215"/>
+            <a:off x="6624770" y="1999603"/>
             <a:ext cx="198900" cy="593656"/>
             <a:chOff x="3918084" y="1610215"/>
             <a:chExt cx="198900" cy="593656"/>
@@ -9414,8 +9538,8 @@
         </p:nvSpPr>
         <p:spPr>
           <a:xfrm>
-            <a:off x="5932500" y="795050"/>
-            <a:ext cx="3211500" cy="682500"/>
+            <a:off x="4673438" y="126100"/>
+            <a:ext cx="4286700" cy="1873500"/>
           </a:xfrm>
           <a:prstGeom prst="rect">
             <a:avLst/>
@@ -9427,7 +9551,31 @@
           </a:bodyPr>
           <a:lstStyle/>
           <a:p>
-            <a:pPr indent="0" lvl="0" marL="0" rtl="0" algn="l">
+            <a:pPr indent="0" lvl="0" marL="0" rtl="0" algn="just">
+              <a:spcBef>
+                <a:spcPts val="0"/>
+              </a:spcBef>
+              <a:spcAft>
+                <a:spcPts val="0"/>
+              </a:spcAft>
+              <a:buNone/>
+            </a:pPr>
+            <a:r>
+              <a:rPr i="1" lang="ru" sz="5600">
+                <a:solidFill>
+                  <a:srgbClr val="666666"/>
+                </a:solidFill>
+              </a:rPr>
+              <a:t>Встроенный отчёт по ROI скидок – обязателен.</a:t>
+            </a:r>
+            <a:endParaRPr i="1" sz="5600">
+              <a:solidFill>
+                <a:srgbClr val="666666"/>
+              </a:solidFill>
+            </a:endParaRPr>
+          </a:p>
+          <a:p>
+            <a:pPr indent="0" lvl="0" marL="0" rtl="0" algn="just">
               <a:spcBef>
                 <a:spcPts val="0"/>
               </a:spcBef>
@@ -9442,15 +9590,7 @@
                   <a:srgbClr val="666666"/>
                 </a:solidFill>
               </a:rPr>
-              <a:t>Улучшение ROI промо-акций на </a:t>
-            </a:r>
-            <a:r>
-              <a:rPr b="1" lang="ru" sz="5600">
-                <a:solidFill>
-                  <a:srgbClr val="666666"/>
-                </a:solidFill>
-              </a:rPr>
-              <a:t>10–15%</a:t>
+              <a:t>Все конкуренты предоставляют </a:t>
             </a:r>
             <a:r>
               <a:rPr lang="ru" sz="5600">
@@ -9458,7 +9598,90 @@
                   <a:srgbClr val="666666"/>
                 </a:solidFill>
               </a:rPr>
-              <a:t> после внедрения сервиса.</a:t>
+              <a:t>отчеты</a:t>
+            </a:r>
+            <a:r>
+              <a:rPr lang="ru" sz="5600">
+                <a:solidFill>
+                  <a:srgbClr val="666666"/>
+                </a:solidFill>
+              </a:rPr>
+              <a:t> по эффективности кампаний, но у них это лишь часть большого набора </a:t>
+            </a:r>
+            <a:r>
+              <a:rPr lang="ru" sz="5600">
+                <a:solidFill>
+                  <a:srgbClr val="666666"/>
+                </a:solidFill>
+              </a:rPr>
+              <a:t>отчетов</a:t>
+            </a:r>
+            <a:r>
+              <a:rPr lang="ru" sz="5600">
+                <a:solidFill>
+                  <a:srgbClr val="666666"/>
+                </a:solidFill>
+              </a:rPr>
+              <a:t>. </a:t>
+            </a:r>
+            <a:endParaRPr sz="5600">
+              <a:solidFill>
+                <a:srgbClr val="666666"/>
+              </a:solidFill>
+            </a:endParaRPr>
+          </a:p>
+          <a:p>
+            <a:pPr indent="0" lvl="0" marL="0" rtl="0" algn="just">
+              <a:spcBef>
+                <a:spcPts val="0"/>
+              </a:spcBef>
+              <a:spcAft>
+                <a:spcPts val="0"/>
+              </a:spcAft>
+              <a:buNone/>
+            </a:pPr>
+            <a:r>
+              <a:rPr lang="ru" sz="5600">
+                <a:solidFill>
+                  <a:srgbClr val="666666"/>
+                </a:solidFill>
+              </a:rPr>
+              <a:t>В </a:t>
+            </a:r>
+            <a:r>
+              <a:rPr lang="ru" sz="5600">
+                <a:solidFill>
+                  <a:srgbClr val="666666"/>
+                </a:solidFill>
+              </a:rPr>
+              <a:t>моем</a:t>
+            </a:r>
+            <a:r>
+              <a:rPr lang="ru" sz="5600">
+                <a:solidFill>
+                  <a:srgbClr val="666666"/>
+                </a:solidFill>
+              </a:rPr>
+              <a:t> продукте отдельный дашборд по ROI скидок, доле «бесполезных» скидок и инкрементальной выручке – ключевая функция и основной экран для директора по маркетингу.</a:t>
+            </a:r>
+            <a:endParaRPr sz="5600">
+              <a:solidFill>
+                <a:srgbClr val="666666"/>
+              </a:solidFill>
+            </a:endParaRPr>
+          </a:p>
+          <a:p>
+            <a:pPr indent="0" lvl="0" marL="0" rtl="0" algn="l">
+              <a:spcBef>
+                <a:spcPts val="0"/>
+              </a:spcBef>
+              <a:spcAft>
+                <a:spcPts val="0"/>
+              </a:spcAft>
+              <a:buNone/>
+            </a:pPr>
+            <a:r>
+              <a:t/>
             </a:r>
             <a:endParaRPr sz="5600">
               <a:solidFill>
@@ -9507,6 +9730,285 @@
 </file>
 
 <file path=ppt/theme/theme1.xml><?xml version="1.0" encoding="utf-8"?>
+<a:theme xmlns:a="http://schemas.openxmlformats.org/drawingml/2006/main" xmlns:r="http://schemas.openxmlformats.org/officeDocument/2006/relationships">
+  <a:themeElements>
+    <a:clrScheme name="Default">
+      <a:dk1>
+        <a:srgbClr val="000000"/>
+      </a:dk1>
+      <a:lt1>
+        <a:srgbClr val="FFFFFF"/>
+      </a:lt1>
+      <a:dk2>
+        <a:srgbClr val="158158"/>
+      </a:dk2>
+      <a:lt2>
+        <a:srgbClr val="F3F3F3"/>
+      </a:lt2>
+      <a:accent1>
+        <a:srgbClr val="058DC7"/>
+      </a:accent1>
+      <a:accent2>
+        <a:srgbClr val="50B432"/>
+      </a:accent2>
+      <a:accent3>
+        <a:srgbClr val="ED561B"/>
+      </a:accent3>
+      <a:accent4>
+        <a:srgbClr val="EDEF00"/>
+      </a:accent4>
+      <a:accent5>
+        <a:srgbClr val="24CBE5"/>
+      </a:accent5>
+      <a:accent6>
+        <a:srgbClr val="64E572"/>
+      </a:accent6>
+      <a:hlink>
+        <a:srgbClr val="2200CC"/>
+      </a:hlink>
+      <a:folHlink>
+        <a:srgbClr val="551A8B"/>
+      </a:folHlink>
+    </a:clrScheme>
+    <a:fontScheme name="Office">
+      <a:majorFont>
+        <a:latin typeface="Arial"/>
+        <a:ea typeface=""/>
+        <a:cs typeface=""/>
+        <a:font script="Jpan" typeface="ＭＳ Ｐゴシック"/>
+        <a:font script="Hang" typeface="맑은 고딕"/>
+        <a:font script="Hans" typeface="宋体"/>
+        <a:font script="Hant" typeface="新細明體"/>
+        <a:font script="Arab" typeface="Times New Roman"/>
+        <a:font script="Hebr" typeface="Times New Roman"/>
+        <a:font script="Thai" typeface="Angsana New"/>
+        <a:font script="Ethi" typeface="Nyala"/>
+        <a:font script="Beng" typeface="Vrinda"/>
+        <a:font script="Gujr" typeface="Shruti"/>
+        <a:font script="Khmr" typeface="MoolBoran"/>
+        <a:font script="Knda" typeface="Tunga"/>
+        <a:font script="Guru" typeface="Raavi"/>
+        <a:font script="Cans" typeface="Euphemia"/>
+        <a:font script="Cher" typeface="Plantagenet Cherokee"/>
+        <a:font script="Yiii" typeface="Microsoft Yi Baiti"/>
+        <a:font script="Tibt" typeface="Microsoft Himalaya"/>
+        <a:font script="Thaa" typeface="MV Boli"/>
+        <a:font script="Deva" typeface="Mangal"/>
+        <a:font script="Telu" typeface="Gautami"/>
+        <a:font script="Taml" typeface="Latha"/>
+        <a:font script="Syrc" typeface="Estrangelo Edessa"/>
+        <a:font script="Orya" typeface="Kalinga"/>
+        <a:font script="Mlym" typeface="Kartika"/>
+        <a:font script="Laoo" typeface="DokChampa"/>
+        <a:font script="Sinh" typeface="Iskoola Pota"/>
+        <a:font script="Mong" typeface="Mongolian Baiti"/>
+        <a:font script="Viet" typeface="Times New Roman"/>
+        <a:font script="Uigh" typeface="Microsoft Uighur"/>
+        <a:font script="Geor" typeface="Sylfaen"/>
+      </a:majorFont>
+      <a:minorFont>
+        <a:latin typeface="Arial"/>
+        <a:ea typeface=""/>
+        <a:cs typeface=""/>
+        <a:font script="Jpan" typeface="ＭＳ Ｐゴシック"/>
+        <a:font script="Hang" typeface="맑은 고딕"/>
+        <a:font script="Hans" typeface="宋体"/>
+        <a:font script="Hant" typeface="新細明體"/>
+        <a:font script="Arab" typeface="Arial"/>
+        <a:font script="Hebr" typeface="Arial"/>
+        <a:font script="Thai" typeface="Cordia New"/>
+        <a:font script="Ethi" typeface="Nyala"/>
+        <a:font script="Beng" typeface="Vrinda"/>
+        <a:font script="Gujr" typeface="Shruti"/>
+        <a:font script="Khmr" typeface="DaunPenh"/>
+        <a:font script="Knda" typeface="Tunga"/>
+        <a:font script="Guru" typeface="Raavi"/>
+        <a:font script="Cans" typeface="Euphemia"/>
+        <a:font script="Cher" typeface="Plantagenet Cherokee"/>
+        <a:font script="Yiii" typeface="Microsoft Yi Baiti"/>
+        <a:font script="Tibt" typeface="Microsoft Himalaya"/>
+        <a:font script="Thaa" typeface="MV Boli"/>
+        <a:font script="Deva" typeface="Mangal"/>
+        <a:font script="Telu" typeface="Gautami"/>
+        <a:font script="Taml" typeface="Latha"/>
+        <a:font script="Syrc" typeface="Estrangelo Edessa"/>
+        <a:font script="Orya" typeface="Kalinga"/>
+        <a:font script="Mlym" typeface="Kartika"/>
+        <a:font script="Laoo" typeface="DokChampa"/>
+        <a:font script="Sinh" typeface="Iskoola Pota"/>
+        <a:font script="Mong" typeface="Mongolian Baiti"/>
+        <a:font script="Viet" typeface="Arial"/>
+        <a:font script="Uigh" typeface="Microsoft Uighur"/>
+        <a:font script="Geor" typeface="Sylfaen"/>
+      </a:minorFont>
+    </a:fontScheme>
+    <a:fmtScheme name="Office">
+      <a:fillStyleLst>
+        <a:solidFill>
+          <a:schemeClr val="phClr"/>
+        </a:solidFill>
+        <a:gradFill rotWithShape="1">
+          <a:gsLst>
+            <a:gs pos="0">
+              <a:schemeClr val="phClr">
+                <a:tint val="50000"/>
+                <a:satMod val="300000"/>
+              </a:schemeClr>
+            </a:gs>
+            <a:gs pos="35000">
+              <a:schemeClr val="phClr">
+                <a:tint val="37000"/>
+                <a:satMod val="300000"/>
+              </a:schemeClr>
+            </a:gs>
+            <a:gs pos="100000">
+              <a:schemeClr val="phClr">
+                <a:tint val="15000"/>
+                <a:satMod val="350000"/>
+              </a:schemeClr>
+            </a:gs>
+          </a:gsLst>
+          <a:lin ang="16200000" scaled="1"/>
+        </a:gradFill>
+        <a:gradFill rotWithShape="1">
+          <a:gsLst>
+            <a:gs pos="0">
+              <a:schemeClr val="phClr">
+                <a:tint val="100000"/>
+                <a:shade val="100000"/>
+                <a:satMod val="130000"/>
+              </a:schemeClr>
+            </a:gs>
+            <a:gs pos="100000">
+              <a:schemeClr val="phClr">
+                <a:tint val="50000"/>
+                <a:shade val="100000"/>
+                <a:satMod val="350000"/>
+              </a:schemeClr>
+            </a:gs>
+          </a:gsLst>
+          <a:lin ang="16200000" scaled="0"/>
+        </a:gradFill>
+      </a:fillStyleLst>
+      <a:lnStyleLst>
+        <a:ln w="9525" cap="flat" cmpd="sng" algn="ctr">
+          <a:solidFill>
+            <a:schemeClr val="phClr">
+              <a:shade val="95000"/>
+              <a:satMod val="105000"/>
+            </a:schemeClr>
+          </a:solidFill>
+          <a:prstDash val="solid"/>
+        </a:ln>
+        <a:ln w="25400" cap="flat" cmpd="sng" algn="ctr">
+          <a:solidFill>
+            <a:schemeClr val="phClr"/>
+          </a:solidFill>
+          <a:prstDash val="solid"/>
+        </a:ln>
+        <a:ln w="38100" cap="flat" cmpd="sng" algn="ctr">
+          <a:solidFill>
+            <a:schemeClr val="phClr"/>
+          </a:solidFill>
+          <a:prstDash val="solid"/>
+        </a:ln>
+      </a:lnStyleLst>
+      <a:effectStyleLst>
+        <a:effectStyle>
+          <a:effectLst>
+            <a:outerShdw blurRad="40000" dist="20000" dir="5400000" rotWithShape="0">
+              <a:srgbClr val="000000">
+                <a:alpha val="38000"/>
+              </a:srgbClr>
+            </a:outerShdw>
+          </a:effectLst>
+        </a:effectStyle>
+        <a:effectStyle>
+          <a:effectLst>
+            <a:outerShdw blurRad="40000" dist="23000" dir="5400000" rotWithShape="0">
+              <a:srgbClr val="000000">
+                <a:alpha val="35000"/>
+              </a:srgbClr>
+            </a:outerShdw>
+          </a:effectLst>
+        </a:effectStyle>
+        <a:effectStyle>
+          <a:effectLst>
+            <a:outerShdw blurRad="40000" dist="23000" dir="5400000" rotWithShape="0">
+              <a:srgbClr val="000000">
+                <a:alpha val="35000"/>
+              </a:srgbClr>
+            </a:outerShdw>
+          </a:effectLst>
+          <a:scene3d>
+            <a:camera prst="orthographicFront">
+              <a:rot lat="0" lon="0" rev="0"/>
+            </a:camera>
+            <a:lightRig rig="threePt" dir="t">
+              <a:rot lat="0" lon="0" rev="1200000"/>
+            </a:lightRig>
+          </a:scene3d>
+          <a:sp3d>
+            <a:bevelT w="63500" h="25400"/>
+          </a:sp3d>
+        </a:effectStyle>
+      </a:effectStyleLst>
+      <a:bgFillStyleLst>
+        <a:solidFill>
+          <a:schemeClr val="phClr"/>
+        </a:solidFill>
+        <a:gradFill rotWithShape="1">
+          <a:gsLst>
+            <a:gs pos="0">
+              <a:schemeClr val="phClr">
+                <a:tint val="40000"/>
+                <a:satMod val="350000"/>
+              </a:schemeClr>
+            </a:gs>
+            <a:gs pos="40000">
+              <a:schemeClr val="phClr">
+                <a:tint val="45000"/>
+                <a:shade val="99000"/>
+                <a:satMod val="350000"/>
+              </a:schemeClr>
+            </a:gs>
+            <a:gs pos="100000">
+              <a:schemeClr val="phClr">
+                <a:shade val="20000"/>
+                <a:satMod val="255000"/>
+              </a:schemeClr>
+            </a:gs>
+          </a:gsLst>
+          <a:path path="circle">
+            <a:fillToRect l="50000" t="-80000" r="50000" b="180000"/>
+          </a:path>
+        </a:gradFill>
+        <a:gradFill rotWithShape="1">
+          <a:gsLst>
+            <a:gs pos="0">
+              <a:schemeClr val="phClr">
+                <a:tint val="80000"/>
+                <a:satMod val="300000"/>
+              </a:schemeClr>
+            </a:gs>
+            <a:gs pos="100000">
+              <a:schemeClr val="phClr">
+                <a:shade val="30000"/>
+                <a:satMod val="200000"/>
+              </a:schemeClr>
+            </a:gs>
+          </a:gsLst>
+          <a:path path="circle">
+            <a:fillToRect l="50000" t="50000" r="50000" b="50000"/>
+          </a:path>
+        </a:gradFill>
+      </a:bgFillStyleLst>
+    </a:fmtScheme>
+  </a:themeElements>
+</a:theme>
+</file>
+
+<file path=ppt/theme/theme2.xml><?xml version="1.0" encoding="utf-8"?>
 <a:theme xmlns:a="http://schemas.openxmlformats.org/drawingml/2006/main" xmlns:r="http://schemas.openxmlformats.org/officeDocument/2006/relationships" name="Paradigm">
   <a:themeElements>
     <a:clrScheme name="Paradigm">
@@ -9783,283 +10285,4 @@
     </a:fmtScheme>
   </a:themeElements>
 </a:theme>
-</file>
-
-<file path=ppt/theme/theme2.xml><?xml version="1.0" encoding="utf-8"?>
-<a:theme xmlns:a="http://schemas.openxmlformats.org/drawingml/2006/main" xmlns:r="http://schemas.openxmlformats.org/officeDocument/2006/relationships">
-  <a:themeElements>
-    <a:clrScheme name="Default">
-      <a:dk1>
-        <a:srgbClr val="000000"/>
-      </a:dk1>
-      <a:lt1>
-        <a:srgbClr val="FFFFFF"/>
-      </a:lt1>
-      <a:dk2>
-        <a:srgbClr val="158158"/>
-      </a:dk2>
-      <a:lt2>
-        <a:srgbClr val="F3F3F3"/>
-      </a:lt2>
-      <a:accent1>
-        <a:srgbClr val="058DC7"/>
-      </a:accent1>
-      <a:accent2>
-        <a:srgbClr val="50B432"/>
-      </a:accent2>
-      <a:accent3>
-        <a:srgbClr val="ED561B"/>
-      </a:accent3>
-      <a:accent4>
-        <a:srgbClr val="EDEF00"/>
-      </a:accent4>
-      <a:accent5>
-        <a:srgbClr val="24CBE5"/>
-      </a:accent5>
-      <a:accent6>
-        <a:srgbClr val="64E572"/>
-      </a:accent6>
-      <a:hlink>
-        <a:srgbClr val="2200CC"/>
-      </a:hlink>
-      <a:folHlink>
-        <a:srgbClr val="551A8B"/>
-      </a:folHlink>
-    </a:clrScheme>
-    <a:fontScheme name="Office">
-      <a:majorFont>
-        <a:latin typeface="Arial"/>
-        <a:ea typeface=""/>
-        <a:cs typeface=""/>
-        <a:font script="Jpan" typeface="ＭＳ Ｐゴシック"/>
-        <a:font script="Hang" typeface="맑은 고딕"/>
-        <a:font script="Hans" typeface="宋体"/>
-        <a:font script="Hant" typeface="新細明體"/>
-        <a:font script="Arab" typeface="Times New Roman"/>
-        <a:font script="Hebr" typeface="Times New Roman"/>
-        <a:font script="Thai" typeface="Angsana New"/>
-        <a:font script="Ethi" typeface="Nyala"/>
-        <a:font script="Beng" typeface="Vrinda"/>
-        <a:font script="Gujr" typeface="Shruti"/>
-        <a:font script="Khmr" typeface="MoolBoran"/>
-        <a:font script="Knda" typeface="Tunga"/>
-        <a:font script="Guru" typeface="Raavi"/>
-        <a:font script="Cans" typeface="Euphemia"/>
-        <a:font script="Cher" typeface="Plantagenet Cherokee"/>
-        <a:font script="Yiii" typeface="Microsoft Yi Baiti"/>
-        <a:font script="Tibt" typeface="Microsoft Himalaya"/>
-        <a:font script="Thaa" typeface="MV Boli"/>
-        <a:font script="Deva" typeface="Mangal"/>
-        <a:font script="Telu" typeface="Gautami"/>
-        <a:font script="Taml" typeface="Latha"/>
-        <a:font script="Syrc" typeface="Estrangelo Edessa"/>
-        <a:font script="Orya" typeface="Kalinga"/>
-        <a:font script="Mlym" typeface="Kartika"/>
-        <a:font script="Laoo" typeface="DokChampa"/>
-        <a:font script="Sinh" typeface="Iskoola Pota"/>
-        <a:font script="Mong" typeface="Mongolian Baiti"/>
-        <a:font script="Viet" typeface="Times New Roman"/>
-        <a:font script="Uigh" typeface="Microsoft Uighur"/>
-        <a:font script="Geor" typeface="Sylfaen"/>
-      </a:majorFont>
-      <a:minorFont>
-        <a:latin typeface="Arial"/>
-        <a:ea typeface=""/>
-        <a:cs typeface=""/>
-        <a:font script="Jpan" typeface="ＭＳ Ｐゴシック"/>
-        <a:font script="Hang" typeface="맑은 고딕"/>
-        <a:font script="Hans" typeface="宋体"/>
-        <a:font script="Hant" typeface="新細明體"/>
-        <a:font script="Arab" typeface="Arial"/>
-        <a:font script="Hebr" typeface="Arial"/>
-        <a:font script="Thai" typeface="Cordia New"/>
-        <a:font script="Ethi" typeface="Nyala"/>
-        <a:font script="Beng" typeface="Vrinda"/>
-        <a:font script="Gujr" typeface="Shruti"/>
-        <a:font script="Khmr" typeface="DaunPenh"/>
-        <a:font script="Knda" typeface="Tunga"/>
-        <a:font script="Guru" typeface="Raavi"/>
-        <a:font script="Cans" typeface="Euphemia"/>
-        <a:font script="Cher" typeface="Plantagenet Cherokee"/>
-        <a:font script="Yiii" typeface="Microsoft Yi Baiti"/>
-        <a:font script="Tibt" typeface="Microsoft Himalaya"/>
-        <a:font script="Thaa" typeface="MV Boli"/>
-        <a:font script="Deva" typeface="Mangal"/>
-        <a:font script="Telu" typeface="Gautami"/>
-        <a:font script="Taml" typeface="Latha"/>
-        <a:font script="Syrc" typeface="Estrangelo Edessa"/>
-        <a:font script="Orya" typeface="Kalinga"/>
-        <a:font script="Mlym" typeface="Kartika"/>
-        <a:font script="Laoo" typeface="DokChampa"/>
-        <a:font script="Sinh" typeface="Iskoola Pota"/>
-        <a:font script="Mong" typeface="Mongolian Baiti"/>
-        <a:font script="Viet" typeface="Arial"/>
-        <a:font script="Uigh" typeface="Microsoft Uighur"/>
-        <a:font script="Geor" typeface="Sylfaen"/>
-      </a:minorFont>
-    </a:fontScheme>
-    <a:fmtScheme name="Office">
-      <a:fillStyleLst>
-        <a:solidFill>
-          <a:schemeClr val="phClr"/>
-        </a:solidFill>
-        <a:gradFill rotWithShape="1">
-          <a:gsLst>
-            <a:gs pos="0">
-              <a:schemeClr val="phClr">
-                <a:tint val="50000"/>
-                <a:satMod val="300000"/>
-              </a:schemeClr>
-            </a:gs>
-            <a:gs pos="35000">
-              <a:schemeClr val="phClr">
-                <a:tint val="37000"/>
-                <a:satMod val="300000"/>
-              </a:schemeClr>
-            </a:gs>
-            <a:gs pos="100000">
-              <a:schemeClr val="phClr">
-                <a:tint val="15000"/>
-                <a:satMod val="350000"/>
-              </a:schemeClr>
-            </a:gs>
-          </a:gsLst>
-          <a:lin ang="16200000" scaled="1"/>
-        </a:gradFill>
-        <a:gradFill rotWithShape="1">
-          <a:gsLst>
-            <a:gs pos="0">
-              <a:schemeClr val="phClr">
-                <a:tint val="100000"/>
-                <a:shade val="100000"/>
-                <a:satMod val="130000"/>
-              </a:schemeClr>
-            </a:gs>
-            <a:gs pos="100000">
-              <a:schemeClr val="phClr">
-                <a:tint val="50000"/>
-                <a:shade val="100000"/>
-                <a:satMod val="350000"/>
-              </a:schemeClr>
-            </a:gs>
-          </a:gsLst>
-          <a:lin ang="16200000" scaled="0"/>
-        </a:gradFill>
-      </a:fillStyleLst>
-      <a:lnStyleLst>
-        <a:ln w="9525" cap="flat" cmpd="sng" algn="ctr">
-          <a:solidFill>
-            <a:schemeClr val="phClr">
-              <a:shade val="95000"/>
-              <a:satMod val="105000"/>
-            </a:schemeClr>
-          </a:solidFill>
-          <a:prstDash val="solid"/>
-        </a:ln>
-        <a:ln w="25400" cap="flat" cmpd="sng" algn="ctr">
-          <a:solidFill>
-            <a:schemeClr val="phClr"/>
-          </a:solidFill>
-          <a:prstDash val="solid"/>
-        </a:ln>
-        <a:ln w="38100" cap="flat" cmpd="sng" algn="ctr">
-          <a:solidFill>
-            <a:schemeClr val="phClr"/>
-          </a:solidFill>
-          <a:prstDash val="solid"/>
-        </a:ln>
-      </a:lnStyleLst>
-      <a:effectStyleLst>
-        <a:effectStyle>
-          <a:effectLst>
-            <a:outerShdw blurRad="40000" dist="20000" dir="5400000" rotWithShape="0">
-              <a:srgbClr val="000000">
-                <a:alpha val="38000"/>
-              </a:srgbClr>
-            </a:outerShdw>
-          </a:effectLst>
-        </a:effectStyle>
-        <a:effectStyle>
-          <a:effectLst>
-            <a:outerShdw blurRad="40000" dist="23000" dir="5400000" rotWithShape="0">
-              <a:srgbClr val="000000">
-                <a:alpha val="35000"/>
-              </a:srgbClr>
-            </a:outerShdw>
-          </a:effectLst>
-        </a:effectStyle>
-        <a:effectStyle>
-          <a:effectLst>
-            <a:outerShdw blurRad="40000" dist="23000" dir="5400000" rotWithShape="0">
-              <a:srgbClr val="000000">
-                <a:alpha val="35000"/>
-              </a:srgbClr>
-            </a:outerShdw>
-          </a:effectLst>
-          <a:scene3d>
-            <a:camera prst="orthographicFront">
-              <a:rot lat="0" lon="0" rev="0"/>
-            </a:camera>
-            <a:lightRig rig="threePt" dir="t">
-              <a:rot lat="0" lon="0" rev="1200000"/>
-            </a:lightRig>
-          </a:scene3d>
-          <a:sp3d>
-            <a:bevelT w="63500" h="25400"/>
-          </a:sp3d>
-        </a:effectStyle>
-      </a:effectStyleLst>
-      <a:bgFillStyleLst>
-        <a:solidFill>
-          <a:schemeClr val="phClr"/>
-        </a:solidFill>
-        <a:gradFill rotWithShape="1">
-          <a:gsLst>
-            <a:gs pos="0">
-              <a:schemeClr val="phClr">
-                <a:tint val="40000"/>
-                <a:satMod val="350000"/>
-              </a:schemeClr>
-            </a:gs>
-            <a:gs pos="40000">
-              <a:schemeClr val="phClr">
-                <a:tint val="45000"/>
-                <a:shade val="99000"/>
-                <a:satMod val="350000"/>
-              </a:schemeClr>
-            </a:gs>
-            <a:gs pos="100000">
-              <a:schemeClr val="phClr">
-                <a:shade val="20000"/>
-                <a:satMod val="255000"/>
-              </a:schemeClr>
-            </a:gs>
-          </a:gsLst>
-          <a:path path="circle">
-            <a:fillToRect l="50000" t="-80000" r="50000" b="180000"/>
-          </a:path>
-        </a:gradFill>
-        <a:gradFill rotWithShape="1">
-          <a:gsLst>
-            <a:gs pos="0">
-              <a:schemeClr val="phClr">
-                <a:tint val="80000"/>
-                <a:satMod val="300000"/>
-              </a:schemeClr>
-            </a:gs>
-            <a:gs pos="100000">
-              <a:schemeClr val="phClr">
-                <a:shade val="30000"/>
-                <a:satMod val="200000"/>
-              </a:schemeClr>
-            </a:gs>
-          </a:gsLst>
-          <a:path path="circle">
-            <a:fillToRect l="50000" t="50000" r="50000" b="50000"/>
-          </a:path>
-        </a:gradFill>
-      </a:bgFillStyleLst>
-    </a:fmtScheme>
-  </a:themeElements>
-</a:theme>
 </file>
</xml_diff>